<commit_message>
Apply terasolunaorg/terasoluna-gfw#14(modify description of disabled page link). #700
</commit_message>
<xml_diff>
--- a/source/ArchitectureInDetail/images_Pagination/materialPagination.pptx
+++ b/source/ArchitectureInDetail/images_Pagination/materialPagination.pptx
@@ -236,7 +236,7 @@
             <a:fld id="{3BB47352-BF5A-4CD2-B029-996118CD8E01}" type="datetimeFigureOut">
               <a:rPr kumimoji="1" lang="ja-JP" altLang="en-US" smtClean="0"/>
               <a:pPr/>
-              <a:t>2014/2/27</a:t>
+              <a:t>2015/1/7</a:t>
             </a:fld>
             <a:endParaRPr kumimoji="1" lang="ja-JP" altLang="en-US"/>
           </a:p>
@@ -719,7 +719,7 @@
             <a:fld id="{7B9B12EC-6AA0-374B-A2D3-850081A07A26}" type="datetimeFigureOut">
               <a:rPr kumimoji="1" lang="ja-JP" altLang="en-US" smtClean="0"/>
               <a:pPr/>
-              <a:t>2014/2/27</a:t>
+              <a:t>2015/1/7</a:t>
             </a:fld>
             <a:endParaRPr kumimoji="1" lang="ja-JP" altLang="en-US"/>
           </a:p>
@@ -923,7 +923,7 @@
             <a:fld id="{7B9B12EC-6AA0-374B-A2D3-850081A07A26}" type="datetimeFigureOut">
               <a:rPr kumimoji="1" lang="ja-JP" altLang="en-US" smtClean="0"/>
               <a:pPr/>
-              <a:t>2014/2/27</a:t>
+              <a:t>2015/1/7</a:t>
             </a:fld>
             <a:endParaRPr kumimoji="1" lang="ja-JP" altLang="en-US"/>
           </a:p>
@@ -1137,7 +1137,7 @@
             <a:fld id="{7B9B12EC-6AA0-374B-A2D3-850081A07A26}" type="datetimeFigureOut">
               <a:rPr kumimoji="1" lang="ja-JP" altLang="en-US" smtClean="0"/>
               <a:pPr/>
-              <a:t>2014/2/27</a:t>
+              <a:t>2015/1/7</a:t>
             </a:fld>
             <a:endParaRPr kumimoji="1" lang="ja-JP" altLang="en-US"/>
           </a:p>
@@ -1341,7 +1341,7 @@
             <a:fld id="{7B9B12EC-6AA0-374B-A2D3-850081A07A26}" type="datetimeFigureOut">
               <a:rPr kumimoji="1" lang="ja-JP" altLang="en-US" smtClean="0"/>
               <a:pPr/>
-              <a:t>2014/2/27</a:t>
+              <a:t>2015/1/7</a:t>
             </a:fld>
             <a:endParaRPr kumimoji="1" lang="ja-JP" altLang="en-US"/>
           </a:p>
@@ -1589,7 +1589,7 @@
             <a:fld id="{7B9B12EC-6AA0-374B-A2D3-850081A07A26}" type="datetimeFigureOut">
               <a:rPr kumimoji="1" lang="ja-JP" altLang="en-US" smtClean="0"/>
               <a:pPr/>
-              <a:t>2014/2/27</a:t>
+              <a:t>2015/1/7</a:t>
             </a:fld>
             <a:endParaRPr kumimoji="1" lang="ja-JP" altLang="en-US"/>
           </a:p>
@@ -1943,7 +1943,7 @@
             <a:fld id="{7B9B12EC-6AA0-374B-A2D3-850081A07A26}" type="datetimeFigureOut">
               <a:rPr kumimoji="1" lang="ja-JP" altLang="en-US" smtClean="0"/>
               <a:pPr/>
-              <a:t>2014/2/27</a:t>
+              <a:t>2015/1/7</a:t>
             </a:fld>
             <a:endParaRPr kumimoji="1" lang="ja-JP" altLang="en-US"/>
           </a:p>
@@ -2431,7 +2431,7 @@
             <a:fld id="{7B9B12EC-6AA0-374B-A2D3-850081A07A26}" type="datetimeFigureOut">
               <a:rPr kumimoji="1" lang="ja-JP" altLang="en-US" smtClean="0"/>
               <a:pPr/>
-              <a:t>2014/2/27</a:t>
+              <a:t>2015/1/7</a:t>
             </a:fld>
             <a:endParaRPr kumimoji="1" lang="ja-JP" altLang="en-US"/>
           </a:p>
@@ -2551,7 +2551,7 @@
             <a:fld id="{7B9B12EC-6AA0-374B-A2D3-850081A07A26}" type="datetimeFigureOut">
               <a:rPr kumimoji="1" lang="ja-JP" altLang="en-US" smtClean="0"/>
               <a:pPr/>
-              <a:t>2014/2/27</a:t>
+              <a:t>2015/1/7</a:t>
             </a:fld>
             <a:endParaRPr kumimoji="1" lang="ja-JP" altLang="en-US"/>
           </a:p>
@@ -2648,7 +2648,7 @@
             <a:fld id="{7B9B12EC-6AA0-374B-A2D3-850081A07A26}" type="datetimeFigureOut">
               <a:rPr kumimoji="1" lang="ja-JP" altLang="en-US" smtClean="0"/>
               <a:pPr/>
-              <a:t>2014/2/27</a:t>
+              <a:t>2015/1/7</a:t>
             </a:fld>
             <a:endParaRPr kumimoji="1" lang="ja-JP" altLang="en-US"/>
           </a:p>
@@ -2959,7 +2959,7 @@
             <a:fld id="{7B9B12EC-6AA0-374B-A2D3-850081A07A26}" type="datetimeFigureOut">
               <a:rPr kumimoji="1" lang="ja-JP" altLang="en-US" smtClean="0"/>
               <a:pPr/>
-              <a:t>2014/2/27</a:t>
+              <a:t>2015/1/7</a:t>
             </a:fld>
             <a:endParaRPr kumimoji="1" lang="ja-JP" altLang="en-US"/>
           </a:p>
@@ -3214,7 +3214,7 @@
             <a:fld id="{7B9B12EC-6AA0-374B-A2D3-850081A07A26}" type="datetimeFigureOut">
               <a:rPr kumimoji="1" lang="ja-JP" altLang="en-US" smtClean="0"/>
               <a:pPr/>
-              <a:t>2014/2/27</a:t>
+              <a:t>2015/1/7</a:t>
             </a:fld>
             <a:endParaRPr kumimoji="1" lang="ja-JP" altLang="en-US"/>
           </a:p>
@@ -3461,7 +3461,7 @@
             <a:fld id="{7B9B12EC-6AA0-374B-A2D3-850081A07A26}" type="datetimeFigureOut">
               <a:rPr kumimoji="1" lang="ja-JP" altLang="en-US" smtClean="0"/>
               <a:pPr/>
-              <a:t>2014/2/27</a:t>
+              <a:t>2015/1/7</a:t>
             </a:fld>
             <a:endParaRPr kumimoji="1" lang="ja-JP" altLang="en-US"/>
           </a:p>
@@ -11816,8 +11816,16 @@
               <a:t>href</a:t>
             </a:r>
             <a:r>
-              <a:rPr lang="en-US" altLang="ja-JP" sz="1300" dirty="0"/>
-              <a:t>="#"&gt;&amp;</a:t>
+              <a:rPr lang="en-US" altLang="ja-JP" sz="1300" dirty="0" smtClean="0"/>
+              <a:t>=“</a:t>
+            </a:r>
+            <a:r>
+              <a:rPr lang="en-US" altLang="ja-JP" sz="1300" dirty="0" err="1" smtClean="0"/>
+              <a:t>javascript:void</a:t>
+            </a:r>
+            <a:r>
+              <a:rPr lang="en-US" altLang="ja-JP" sz="1300" dirty="0" smtClean="0"/>
+              <a:t>(0)"&gt;&amp;</a:t>
             </a:r>
             <a:r>
               <a:rPr lang="en-US" altLang="ja-JP" sz="1300" dirty="0" err="1"/>
@@ -11881,7 +11889,15 @@
             </a:r>
             <a:r>
               <a:rPr lang="en-US" altLang="ja-JP" sz="1300" dirty="0"/>
-              <a:t>="#"&gt;&amp;</a:t>
+              <a:t>="</a:t>
+            </a:r>
+            <a:r>
+              <a:rPr lang="en-US" altLang="ja-JP" sz="1300" dirty="0" err="1"/>
+              <a:t>javascript:void</a:t>
+            </a:r>
+            <a:r>
+              <a:rPr lang="en-US" altLang="ja-JP" sz="1300" dirty="0"/>
+              <a:t>(0)"&gt;&amp;</a:t>
             </a:r>
             <a:r>
               <a:rPr lang="en-US" altLang="ja-JP" sz="1300" dirty="0" err="1"/>
@@ -12819,7 +12835,7 @@
         </p:nvSpPr>
         <p:spPr>
           <a:xfrm>
-            <a:off x="4681045" y="1027276"/>
+            <a:off x="4689283" y="1027276"/>
             <a:ext cx="442750" cy="369332"/>
           </a:xfrm>
           <a:prstGeom prst="rect">
@@ -12879,7 +12895,7 @@
         </p:nvSpPr>
         <p:spPr>
           <a:xfrm rot="10800000">
-            <a:off x="4296229" y="1099457"/>
+            <a:off x="4304467" y="1099457"/>
             <a:ext cx="402931" cy="224971"/>
           </a:xfrm>
           <a:prstGeom prst="rightArrow">
@@ -14862,8 +14878,24 @@
               <a:t>href</a:t>
             </a:r>
             <a:r>
-              <a:rPr lang="en-US" altLang="ja-JP" sz="1300" dirty="0"/>
-              <a:t>="#"&gt;</a:t>
+              <a:rPr lang="en-US" altLang="ja-JP" sz="1300" dirty="0" smtClean="0"/>
+              <a:t>=“</a:t>
+            </a:r>
+            <a:r>
+              <a:rPr lang="en-US" altLang="ja-JP" sz="1300" dirty="0" err="1" smtClean="0"/>
+              <a:t>javascript</a:t>
+            </a:r>
+            <a:r>
+              <a:rPr lang="en-US" altLang="ja-JP" sz="1300" dirty="0" err="1" smtClean="0"/>
+              <a:t>:void</a:t>
+            </a:r>
+            <a:r>
+              <a:rPr lang="en-US" altLang="ja-JP" sz="1300" dirty="0" smtClean="0"/>
+              <a:t>(0)</a:t>
+            </a:r>
+            <a:r>
+              <a:rPr lang="en-US" altLang="ja-JP" sz="1300" dirty="0" smtClean="0"/>
+              <a:t>"&gt;</a:t>
             </a:r>
             <a:r>
               <a:rPr lang="en-US" altLang="ja-JP" b="1" dirty="0"/>
@@ -14919,8 +14951,16 @@
               <a:t>href</a:t>
             </a:r>
             <a:r>
-              <a:rPr lang="en-US" altLang="ja-JP" sz="1300" dirty="0"/>
-              <a:t>="#"&gt;</a:t>
+              <a:rPr lang="en-US" altLang="ja-JP" sz="1300" dirty="0" smtClean="0"/>
+              <a:t>=“</a:t>
+            </a:r>
+            <a:r>
+              <a:rPr lang="en-US" altLang="ja-JP" sz="1300" dirty="0" err="1" smtClean="0"/>
+              <a:t>javascript:void</a:t>
+            </a:r>
+            <a:r>
+              <a:rPr lang="en-US" altLang="ja-JP" sz="1300" dirty="0" smtClean="0"/>
+              <a:t>(0)"&gt;</a:t>
             </a:r>
             <a:r>
               <a:rPr lang="en-US" altLang="ja-JP" b="1" dirty="0" err="1"/>
@@ -15322,7 +15362,7 @@
         </p:nvSpPr>
         <p:spPr>
           <a:xfrm>
-            <a:off x="3390899" y="1077823"/>
+            <a:off x="4470077" y="1077823"/>
             <a:ext cx="586016" cy="221206"/>
           </a:xfrm>
           <a:prstGeom prst="roundRect">
@@ -15370,7 +15410,7 @@
         </p:nvSpPr>
         <p:spPr>
           <a:xfrm>
-            <a:off x="3390898" y="2028508"/>
+            <a:off x="4486552" y="2028508"/>
             <a:ext cx="586016" cy="221206"/>
           </a:xfrm>
           <a:prstGeom prst="roundRect">
@@ -15712,7 +15752,7 @@
         </p:nvSpPr>
         <p:spPr>
           <a:xfrm>
-            <a:off x="3726511" y="1253739"/>
+            <a:off x="4558549" y="1253739"/>
             <a:ext cx="442749" cy="369332"/>
           </a:xfrm>
           <a:prstGeom prst="rect">
@@ -15742,7 +15782,7 @@
         </p:nvSpPr>
         <p:spPr>
           <a:xfrm>
-            <a:off x="3697513" y="2190693"/>
+            <a:off x="4570741" y="2190693"/>
             <a:ext cx="442749" cy="369332"/>
           </a:xfrm>
           <a:prstGeom prst="rect">
@@ -15979,20 +16019,8 @@
               <a:t>href</a:t>
             </a:r>
             <a:r>
-              <a:rPr lang="en-US" altLang="ja-JP" sz="1300" dirty="0"/>
-              <a:t>="</a:t>
-            </a:r>
-            <a:r>
-              <a:rPr lang="en-US" altLang="ja-JP" b="1" dirty="0" err="1"/>
-              <a:t>javascript:void</a:t>
-            </a:r>
-            <a:r>
-              <a:rPr lang="en-US" altLang="ja-JP" b="1" dirty="0"/>
-              <a:t>(0);</a:t>
-            </a:r>
-            <a:r>
-              <a:rPr lang="en-US" altLang="ja-JP" sz="1300" dirty="0"/>
-              <a:t>"&gt;&amp;</a:t>
+              <a:rPr lang="en-US" altLang="ja-JP" sz="1300" dirty="0" smtClean="0"/>
+              <a:t>=“#"&gt;&amp;</a:t>
             </a:r>
             <a:r>
               <a:rPr lang="en-US" altLang="ja-JP" sz="1300" dirty="0" err="1"/>
@@ -16033,16 +16061,8 @@
               <a:t>href</a:t>
             </a:r>
             <a:r>
-              <a:rPr lang="en-US" altLang="ja-JP" sz="1300" dirty="0"/>
-              <a:t>="</a:t>
-            </a:r>
-            <a:r>
-              <a:rPr lang="en-US" altLang="ja-JP" sz="1300" dirty="0" err="1"/>
-              <a:t>javascript:void</a:t>
-            </a:r>
-            <a:r>
-              <a:rPr lang="en-US" altLang="ja-JP" sz="1300" dirty="0"/>
-              <a:t>(0);"&gt;&amp;</a:t>
+              <a:rPr lang="en-US" altLang="ja-JP" sz="1300" dirty="0" smtClean="0"/>
+              <a:t>=“#"&gt;&amp;</a:t>
             </a:r>
             <a:r>
               <a:rPr lang="en-US" altLang="ja-JP" sz="1300" dirty="0" err="1"/>
@@ -16342,8 +16362,8 @@
         </p:nvSpPr>
         <p:spPr>
           <a:xfrm>
-            <a:off x="1787070" y="652033"/>
-            <a:ext cx="1892301" cy="298444"/>
+            <a:off x="1795309" y="635557"/>
+            <a:ext cx="237850" cy="221178"/>
           </a:xfrm>
           <a:prstGeom prst="roundRect">
             <a:avLst/>
@@ -16390,7 +16410,7 @@
         </p:nvSpPr>
         <p:spPr>
           <a:xfrm>
-            <a:off x="1787071" y="1893004"/>
+            <a:off x="1795309" y="1835338"/>
             <a:ext cx="2469212" cy="298444"/>
           </a:xfrm>
           <a:prstGeom prst="roundRect">
@@ -16438,7 +16458,7 @@
         </p:nvSpPr>
         <p:spPr>
           <a:xfrm>
-            <a:off x="4332515" y="1888925"/>
+            <a:off x="4340753" y="1831259"/>
             <a:ext cx="2373085" cy="298444"/>
           </a:xfrm>
           <a:prstGeom prst="roundRect">
@@ -16486,7 +16506,7 @@
         </p:nvSpPr>
         <p:spPr>
           <a:xfrm>
-            <a:off x="3327305" y="282701"/>
+            <a:off x="1787071" y="773474"/>
             <a:ext cx="442749" cy="369332"/>
           </a:xfrm>
           <a:prstGeom prst="rect">
@@ -16576,7 +16596,7 @@
         </p:nvSpPr>
         <p:spPr>
           <a:xfrm>
-            <a:off x="6814459" y="1888925"/>
+            <a:off x="6822697" y="1831259"/>
             <a:ext cx="1045027" cy="298444"/>
           </a:xfrm>
           <a:prstGeom prst="roundRect">

</xml_diff>

<commit_message>
Modify description of active page link(apply terasolunaorg/terasoluna-gfw#13). #699
</commit_message>
<xml_diff>
--- a/source/ArchitectureInDetail/images_Pagination/materialPagination.pptx
+++ b/source/ArchitectureInDetail/images_Pagination/materialPagination.pptx
@@ -236,7 +236,7 @@
             <a:fld id="{3BB47352-BF5A-4CD2-B029-996118CD8E01}" type="datetimeFigureOut">
               <a:rPr kumimoji="1" lang="ja-JP" altLang="en-US" smtClean="0"/>
               <a:pPr/>
-              <a:t>2015/1/7</a:t>
+              <a:t>2015/1/8</a:t>
             </a:fld>
             <a:endParaRPr kumimoji="1" lang="ja-JP" altLang="en-US"/>
           </a:p>
@@ -719,7 +719,7 @@
             <a:fld id="{7B9B12EC-6AA0-374B-A2D3-850081A07A26}" type="datetimeFigureOut">
               <a:rPr kumimoji="1" lang="ja-JP" altLang="en-US" smtClean="0"/>
               <a:pPr/>
-              <a:t>2015/1/7</a:t>
+              <a:t>2015/1/8</a:t>
             </a:fld>
             <a:endParaRPr kumimoji="1" lang="ja-JP" altLang="en-US"/>
           </a:p>
@@ -923,7 +923,7 @@
             <a:fld id="{7B9B12EC-6AA0-374B-A2D3-850081A07A26}" type="datetimeFigureOut">
               <a:rPr kumimoji="1" lang="ja-JP" altLang="en-US" smtClean="0"/>
               <a:pPr/>
-              <a:t>2015/1/7</a:t>
+              <a:t>2015/1/8</a:t>
             </a:fld>
             <a:endParaRPr kumimoji="1" lang="ja-JP" altLang="en-US"/>
           </a:p>
@@ -1137,7 +1137,7 @@
             <a:fld id="{7B9B12EC-6AA0-374B-A2D3-850081A07A26}" type="datetimeFigureOut">
               <a:rPr kumimoji="1" lang="ja-JP" altLang="en-US" smtClean="0"/>
               <a:pPr/>
-              <a:t>2015/1/7</a:t>
+              <a:t>2015/1/8</a:t>
             </a:fld>
             <a:endParaRPr kumimoji="1" lang="ja-JP" altLang="en-US"/>
           </a:p>
@@ -1341,7 +1341,7 @@
             <a:fld id="{7B9B12EC-6AA0-374B-A2D3-850081A07A26}" type="datetimeFigureOut">
               <a:rPr kumimoji="1" lang="ja-JP" altLang="en-US" smtClean="0"/>
               <a:pPr/>
-              <a:t>2015/1/7</a:t>
+              <a:t>2015/1/8</a:t>
             </a:fld>
             <a:endParaRPr kumimoji="1" lang="ja-JP" altLang="en-US"/>
           </a:p>
@@ -1589,7 +1589,7 @@
             <a:fld id="{7B9B12EC-6AA0-374B-A2D3-850081A07A26}" type="datetimeFigureOut">
               <a:rPr kumimoji="1" lang="ja-JP" altLang="en-US" smtClean="0"/>
               <a:pPr/>
-              <a:t>2015/1/7</a:t>
+              <a:t>2015/1/8</a:t>
             </a:fld>
             <a:endParaRPr kumimoji="1" lang="ja-JP" altLang="en-US"/>
           </a:p>
@@ -1943,7 +1943,7 @@
             <a:fld id="{7B9B12EC-6AA0-374B-A2D3-850081A07A26}" type="datetimeFigureOut">
               <a:rPr kumimoji="1" lang="ja-JP" altLang="en-US" smtClean="0"/>
               <a:pPr/>
-              <a:t>2015/1/7</a:t>
+              <a:t>2015/1/8</a:t>
             </a:fld>
             <a:endParaRPr kumimoji="1" lang="ja-JP" altLang="en-US"/>
           </a:p>
@@ -2431,7 +2431,7 @@
             <a:fld id="{7B9B12EC-6AA0-374B-A2D3-850081A07A26}" type="datetimeFigureOut">
               <a:rPr kumimoji="1" lang="ja-JP" altLang="en-US" smtClean="0"/>
               <a:pPr/>
-              <a:t>2015/1/7</a:t>
+              <a:t>2015/1/8</a:t>
             </a:fld>
             <a:endParaRPr kumimoji="1" lang="ja-JP" altLang="en-US"/>
           </a:p>
@@ -2551,7 +2551,7 @@
             <a:fld id="{7B9B12EC-6AA0-374B-A2D3-850081A07A26}" type="datetimeFigureOut">
               <a:rPr kumimoji="1" lang="ja-JP" altLang="en-US" smtClean="0"/>
               <a:pPr/>
-              <a:t>2015/1/7</a:t>
+              <a:t>2015/1/8</a:t>
             </a:fld>
             <a:endParaRPr kumimoji="1" lang="ja-JP" altLang="en-US"/>
           </a:p>
@@ -2648,7 +2648,7 @@
             <a:fld id="{7B9B12EC-6AA0-374B-A2D3-850081A07A26}" type="datetimeFigureOut">
               <a:rPr kumimoji="1" lang="ja-JP" altLang="en-US" smtClean="0"/>
               <a:pPr/>
-              <a:t>2015/1/7</a:t>
+              <a:t>2015/1/8</a:t>
             </a:fld>
             <a:endParaRPr kumimoji="1" lang="ja-JP" altLang="en-US"/>
           </a:p>
@@ -2959,7 +2959,7 @@
             <a:fld id="{7B9B12EC-6AA0-374B-A2D3-850081A07A26}" type="datetimeFigureOut">
               <a:rPr kumimoji="1" lang="ja-JP" altLang="en-US" smtClean="0"/>
               <a:pPr/>
-              <a:t>2015/1/7</a:t>
+              <a:t>2015/1/8</a:t>
             </a:fld>
             <a:endParaRPr kumimoji="1" lang="ja-JP" altLang="en-US"/>
           </a:p>
@@ -3214,7 +3214,7 @@
             <a:fld id="{7B9B12EC-6AA0-374B-A2D3-850081A07A26}" type="datetimeFigureOut">
               <a:rPr kumimoji="1" lang="ja-JP" altLang="en-US" smtClean="0"/>
               <a:pPr/>
-              <a:t>2015/1/7</a:t>
+              <a:t>2015/1/8</a:t>
             </a:fld>
             <a:endParaRPr kumimoji="1" lang="ja-JP" altLang="en-US"/>
           </a:p>
@@ -3461,7 +3461,7 @@
             <a:fld id="{7B9B12EC-6AA0-374B-A2D3-850081A07A26}" type="datetimeFigureOut">
               <a:rPr kumimoji="1" lang="ja-JP" altLang="en-US" smtClean="0"/>
               <a:pPr/>
-              <a:t>2015/1/7</a:t>
+              <a:t>2015/1/8</a:t>
             </a:fld>
             <a:endParaRPr kumimoji="1" lang="ja-JP" altLang="en-US"/>
           </a:p>
@@ -11953,7 +11953,19 @@
             </a:r>
             <a:r>
               <a:rPr lang="en-US" altLang="ja-JP" sz="1300" dirty="0"/>
-              <a:t>="?page=0&amp;size=6"&gt;1&lt;/a&gt;</a:t>
+              <a:t>="</a:t>
+            </a:r>
+            <a:r>
+              <a:rPr lang="en-US" altLang="ja-JP" sz="1300" dirty="0" err="1"/>
+              <a:t>javascript:void</a:t>
+            </a:r>
+            <a:r>
+              <a:rPr lang="en-US" altLang="ja-JP" sz="1300" dirty="0"/>
+              <a:t>(0)"&gt;</a:t>
+            </a:r>
+            <a:r>
+              <a:rPr lang="en-US" altLang="ja-JP" sz="1300" dirty="0"/>
+              <a:t>1&lt;/a&gt;</a:t>
             </a:r>
           </a:p>
           <a:p>
@@ -14883,19 +14895,11 @@
             </a:r>
             <a:r>
               <a:rPr lang="en-US" altLang="ja-JP" sz="1300" dirty="0" err="1" smtClean="0"/>
-              <a:t>javascript</a:t>
-            </a:r>
-            <a:r>
-              <a:rPr lang="en-US" altLang="ja-JP" sz="1300" dirty="0" err="1" smtClean="0"/>
-              <a:t>:void</a:t>
+              <a:t>javascript:void</a:t>
             </a:r>
             <a:r>
               <a:rPr lang="en-US" altLang="ja-JP" sz="1300" dirty="0" smtClean="0"/>
-              <a:t>(0)</a:t>
-            </a:r>
-            <a:r>
-              <a:rPr lang="en-US" altLang="ja-JP" sz="1300" dirty="0" smtClean="0"/>
-              <a:t>"&gt;</a:t>
+              <a:t>(0)"&gt;</a:t>
             </a:r>
             <a:r>
               <a:rPr lang="en-US" altLang="ja-JP" b="1" dirty="0"/>
@@ -15009,7 +15013,19 @@
             </a:r>
             <a:r>
               <a:rPr lang="en-US" altLang="ja-JP" sz="1300" dirty="0"/>
-              <a:t>="?page=0&amp;size=6"&gt;1&lt;/a&gt;</a:t>
+              <a:t>="</a:t>
+            </a:r>
+            <a:r>
+              <a:rPr lang="en-US" altLang="ja-JP" sz="1300" dirty="0" err="1"/>
+              <a:t>javascript:void</a:t>
+            </a:r>
+            <a:r>
+              <a:rPr lang="en-US" altLang="ja-JP" sz="1300" dirty="0"/>
+              <a:t>(0)"&gt;</a:t>
+            </a:r>
+            <a:r>
+              <a:rPr lang="en-US" altLang="ja-JP" sz="1300" dirty="0"/>
+              <a:t>1&lt;/a&gt;</a:t>
             </a:r>
           </a:p>
           <a:p>
@@ -15977,8 +15993,8 @@
         </p:nvSpPr>
         <p:spPr>
           <a:xfrm>
-            <a:off x="849084" y="201108"/>
-            <a:ext cx="7612745" cy="4847481"/>
+            <a:off x="849085" y="201108"/>
+            <a:ext cx="7710030" cy="4847481"/>
           </a:xfrm>
           <a:prstGeom prst="rect">
             <a:avLst/>
@@ -16095,6 +16111,75 @@
               <a:t>href</a:t>
             </a:r>
             <a:r>
+              <a:rPr lang="en-US" altLang="ja-JP" sz="1300" dirty="0"/>
+              <a:t>=“/</a:t>
+            </a:r>
+            <a:r>
+              <a:rPr lang="en-US" altLang="ja-JP" sz="1300" dirty="0" err="1" smtClean="0"/>
+              <a:t>webapp</a:t>
+            </a:r>
+            <a:r>
+              <a:rPr lang="en-US" altLang="ja-JP" sz="1300" dirty="0" smtClean="0"/>
+              <a:t>/article/list/0/6?sort=</a:t>
+            </a:r>
+            <a:r>
+              <a:rPr lang="en-US" altLang="ja-JP" sz="1300" dirty="0" err="1" smtClean="0"/>
+              <a:t>publishedDate,DESC&amp;word</a:t>
+            </a:r>
+            <a:r>
+              <a:rPr lang="en-US" altLang="ja-JP" sz="1300" dirty="0" smtClean="0"/>
+              <a:t>=title</a:t>
+            </a:r>
+            <a:r>
+              <a:rPr lang="en-US" altLang="ja-JP" sz="1300" dirty="0"/>
+              <a:t>"&gt;</a:t>
+            </a:r>
+            <a:r>
+              <a:rPr lang="en-US" altLang="ja-JP" sz="1300" dirty="0"/>
+              <a:t>1&lt;/a&gt;</a:t>
+            </a:r>
+          </a:p>
+          <a:p>
+            <a:r>
+              <a:rPr lang="en-US" altLang="ja-JP" sz="1300" dirty="0"/>
+              <a:t>    &lt;/li&gt;</a:t>
+            </a:r>
+          </a:p>
+          <a:p>
+            <a:r>
+              <a:rPr lang="ja-JP" altLang="en-US" sz="1300" dirty="0"/>
+              <a:t>    </a:t>
+            </a:r>
+          </a:p>
+          <a:p>
+            <a:r>
+              <a:rPr lang="ja-JP" altLang="en-US" sz="1300" dirty="0"/>
+              <a:t>    </a:t>
+            </a:r>
+            <a:r>
+              <a:rPr lang="en-US" altLang="ja-JP" sz="1300" dirty="0"/>
+              <a:t>&lt;!-- ... --&gt;</a:t>
+            </a:r>
+          </a:p>
+          <a:p>
+            <a:endParaRPr lang="ja-JP" altLang="en-US" sz="1300" dirty="0"/>
+          </a:p>
+          <a:p>
+            <a:r>
+              <a:rPr lang="en-US" altLang="ja-JP" sz="1300" dirty="0"/>
+              <a:t>    &lt;li&gt;</a:t>
+            </a:r>
+          </a:p>
+          <a:p>
+            <a:r>
+              <a:rPr lang="en-US" altLang="ja-JP" sz="1300" dirty="0"/>
+              <a:t>        &lt;a </a:t>
+            </a:r>
+            <a:r>
+              <a:rPr lang="en-US" altLang="ja-JP" sz="1300" dirty="0" err="1"/>
+              <a:t>href</a:t>
+            </a:r>
+            <a:r>
               <a:rPr lang="en-US" altLang="ja-JP" sz="1300" dirty="0" smtClean="0"/>
               <a:t>="</a:t>
             </a:r>
@@ -16108,7 +16193,7 @@
             </a:r>
             <a:r>
               <a:rPr lang="en-US" altLang="ja-JP" b="1" dirty="0" smtClean="0"/>
-              <a:t>/article/list/0/6</a:t>
+              <a:t>/article/list/9/6</a:t>
             </a:r>
             <a:r>
               <a:rPr lang="en-US" altLang="ja-JP" sz="1300" dirty="0" smtClean="0"/>
@@ -16137,71 +16222,6 @@
             <a:r>
               <a:rPr lang="en-US" altLang="ja-JP" sz="1300" dirty="0" smtClean="0"/>
               <a:t>"&gt;</a:t>
-            </a:r>
-            <a:r>
-              <a:rPr lang="en-US" altLang="ja-JP" sz="1300" dirty="0"/>
-              <a:t>1&lt;/a&gt;</a:t>
-            </a:r>
-          </a:p>
-          <a:p>
-            <a:r>
-              <a:rPr lang="en-US" altLang="ja-JP" sz="1300" dirty="0"/>
-              <a:t>    &lt;/li&gt;</a:t>
-            </a:r>
-          </a:p>
-          <a:p>
-            <a:r>
-              <a:rPr lang="ja-JP" altLang="en-US" sz="1300" dirty="0"/>
-              <a:t>    </a:t>
-            </a:r>
-          </a:p>
-          <a:p>
-            <a:r>
-              <a:rPr lang="ja-JP" altLang="en-US" sz="1300" dirty="0"/>
-              <a:t>    </a:t>
-            </a:r>
-            <a:r>
-              <a:rPr lang="en-US" altLang="ja-JP" sz="1300" dirty="0"/>
-              <a:t>&lt;!-- ... --&gt;</a:t>
-            </a:r>
-          </a:p>
-          <a:p>
-            <a:endParaRPr lang="ja-JP" altLang="en-US" sz="1300" dirty="0"/>
-          </a:p>
-          <a:p>
-            <a:r>
-              <a:rPr lang="en-US" altLang="ja-JP" sz="1300" dirty="0"/>
-              <a:t>    &lt;li&gt;</a:t>
-            </a:r>
-          </a:p>
-          <a:p>
-            <a:r>
-              <a:rPr lang="en-US" altLang="ja-JP" sz="1300" dirty="0"/>
-              <a:t>        &lt;a </a:t>
-            </a:r>
-            <a:r>
-              <a:rPr lang="en-US" altLang="ja-JP" sz="1300" dirty="0" err="1"/>
-              <a:t>href</a:t>
-            </a:r>
-            <a:r>
-              <a:rPr lang="en-US" altLang="ja-JP" sz="1300" dirty="0" smtClean="0"/>
-              <a:t>="/</a:t>
-            </a:r>
-            <a:r>
-              <a:rPr lang="en-US" altLang="ja-JP" sz="1300" dirty="0" err="1" smtClean="0"/>
-              <a:t>webapp</a:t>
-            </a:r>
-            <a:r>
-              <a:rPr lang="en-US" altLang="ja-JP" sz="1300" dirty="0" smtClean="0"/>
-              <a:t>/article/list/9/6?sort=</a:t>
-            </a:r>
-            <a:r>
-              <a:rPr lang="en-US" altLang="ja-JP" sz="1300" dirty="0" err="1" smtClean="0"/>
-              <a:t>publishedDate,DESC&amp;word</a:t>
-            </a:r>
-            <a:r>
-              <a:rPr lang="en-US" altLang="ja-JP" sz="1300" dirty="0" smtClean="0"/>
-              <a:t>=title"&gt;</a:t>
             </a:r>
             <a:r>
               <a:rPr lang="en-US" altLang="ja-JP" sz="1300" dirty="0"/>
@@ -16410,8 +16430,8 @@
         </p:nvSpPr>
         <p:spPr>
           <a:xfrm>
-            <a:off x="1795309" y="1835338"/>
-            <a:ext cx="2469212" cy="298444"/>
+            <a:off x="1853513" y="3021610"/>
+            <a:ext cx="2394531" cy="298444"/>
           </a:xfrm>
           <a:prstGeom prst="roundRect">
             <a:avLst/>
@@ -16458,8 +16478,8 @@
         </p:nvSpPr>
         <p:spPr>
           <a:xfrm>
-            <a:off x="4340753" y="1831259"/>
-            <a:ext cx="2373085" cy="298444"/>
+            <a:off x="4307801" y="3017531"/>
+            <a:ext cx="2445265" cy="298444"/>
           </a:xfrm>
           <a:prstGeom prst="roundRect">
             <a:avLst/>
@@ -16536,7 +16556,7 @@
         </p:nvSpPr>
         <p:spPr>
           <a:xfrm>
-            <a:off x="3889766" y="1519593"/>
+            <a:off x="3939194" y="2705865"/>
             <a:ext cx="442749" cy="369332"/>
           </a:xfrm>
           <a:prstGeom prst="rect">
@@ -16566,7 +16586,7 @@
         </p:nvSpPr>
         <p:spPr>
           <a:xfrm>
-            <a:off x="6277365" y="1519593"/>
+            <a:off x="6326793" y="2705865"/>
             <a:ext cx="442749" cy="369332"/>
           </a:xfrm>
           <a:prstGeom prst="rect">
@@ -16596,7 +16616,7 @@
         </p:nvSpPr>
         <p:spPr>
           <a:xfrm>
-            <a:off x="6822697" y="1831259"/>
+            <a:off x="6822697" y="3017531"/>
             <a:ext cx="1045027" cy="298444"/>
           </a:xfrm>
           <a:prstGeom prst="roundRect">
@@ -16644,7 +16664,7 @@
         </p:nvSpPr>
         <p:spPr>
           <a:xfrm>
-            <a:off x="7511078" y="1536629"/>
+            <a:off x="7560506" y="2722901"/>
             <a:ext cx="442749" cy="369332"/>
           </a:xfrm>
           <a:prstGeom prst="rect">
@@ -16661,6 +16681,84 @@
             <a:r>
               <a:rPr kumimoji="1" lang="en-US" altLang="ja-JP" dirty="0" smtClean="0"/>
               <a:t>(4)</a:t>
+            </a:r>
+            <a:endParaRPr kumimoji="1" lang="ja-JP" altLang="en-US" dirty="0"/>
+          </a:p>
+        </p:txBody>
+      </p:sp>
+      <p:sp>
+        <p:nvSpPr>
+          <p:cNvPr id="14" name="角丸四角形 13"/>
+          <p:cNvSpPr/>
+          <p:nvPr/>
+        </p:nvSpPr>
+        <p:spPr>
+          <a:xfrm>
+            <a:off x="1853512" y="1806529"/>
+            <a:ext cx="4357818" cy="298444"/>
+          </a:xfrm>
+          <a:prstGeom prst="roundRect">
+            <a:avLst/>
+          </a:prstGeom>
+          <a:noFill/>
+          <a:ln w="19050">
+            <a:solidFill>
+              <a:schemeClr val="tx2">
+                <a:lumMod val="60000"/>
+                <a:lumOff val="40000"/>
+              </a:schemeClr>
+            </a:solidFill>
+            <a:prstDash val="solid"/>
+          </a:ln>
+        </p:spPr>
+        <p:style>
+          <a:lnRef idx="1">
+            <a:schemeClr val="accent1"/>
+          </a:lnRef>
+          <a:fillRef idx="3">
+            <a:schemeClr val="accent1"/>
+          </a:fillRef>
+          <a:effectRef idx="2">
+            <a:schemeClr val="accent1"/>
+          </a:effectRef>
+          <a:fontRef idx="minor">
+            <a:schemeClr val="lt1"/>
+          </a:fontRef>
+        </p:style>
+        <p:txBody>
+          <a:bodyPr rtlCol="0" anchor="ctr"/>
+          <a:lstStyle/>
+          <a:p>
+            <a:pPr algn="ctr"/>
+            <a:endParaRPr kumimoji="1" lang="ja-JP" altLang="en-US"/>
+          </a:p>
+        </p:txBody>
+      </p:sp>
+      <p:sp>
+        <p:nvSpPr>
+          <p:cNvPr id="15" name="テキスト ボックス 14"/>
+          <p:cNvSpPr txBox="1"/>
+          <p:nvPr/>
+        </p:nvSpPr>
+        <p:spPr>
+          <a:xfrm>
+            <a:off x="5847169" y="1445730"/>
+            <a:ext cx="442749" cy="369332"/>
+          </a:xfrm>
+          <a:prstGeom prst="rect">
+            <a:avLst/>
+          </a:prstGeom>
+          <a:noFill/>
+        </p:spPr>
+        <p:txBody>
+          <a:bodyPr wrap="square" rtlCol="0">
+            <a:spAutoFit/>
+          </a:bodyPr>
+          <a:lstStyle/>
+          <a:p>
+            <a:r>
+              <a:rPr kumimoji="1" lang="en-US" altLang="ja-JP" dirty="0" smtClean="0"/>
+              <a:t>(6)</a:t>
             </a:r>
             <a:endParaRPr kumimoji="1" lang="ja-JP" altLang="en-US" dirty="0"/>
           </a:p>

</xml_diff>